<commit_message>
Exports and add schedule xlsx
</commit_message>
<xml_diff>
--- a/public/data/_work-in-progress/_share/square-previews.pptx
+++ b/public/data/_work-in-progress/_share/square-previews.pptx
@@ -259,7 +259,7 @@
           <a:p>
             <a:fld id="{F8790B07-F0DA-42FB-9B41-9B73EF6DB6A9}" type="datetimeFigureOut">
               <a:rPr lang="en-US" smtClean="0"/>
-              <a:t>11/18/2024</a:t>
+              <a:t>11/19/2024</a:t>
             </a:fld>
             <a:endParaRPr lang="en-US"/>
           </a:p>
@@ -457,7 +457,7 @@
           <a:p>
             <a:fld id="{F8790B07-F0DA-42FB-9B41-9B73EF6DB6A9}" type="datetimeFigureOut">
               <a:rPr lang="en-US" smtClean="0"/>
-              <a:t>11/18/2024</a:t>
+              <a:t>11/19/2024</a:t>
             </a:fld>
             <a:endParaRPr lang="en-US"/>
           </a:p>
@@ -665,7 +665,7 @@
           <a:p>
             <a:fld id="{F8790B07-F0DA-42FB-9B41-9B73EF6DB6A9}" type="datetimeFigureOut">
               <a:rPr lang="en-US" smtClean="0"/>
-              <a:t>11/18/2024</a:t>
+              <a:t>11/19/2024</a:t>
             </a:fld>
             <a:endParaRPr lang="en-US"/>
           </a:p>
@@ -863,7 +863,7 @@
           <a:p>
             <a:fld id="{F8790B07-F0DA-42FB-9B41-9B73EF6DB6A9}" type="datetimeFigureOut">
               <a:rPr lang="en-US" smtClean="0"/>
-              <a:t>11/18/2024</a:t>
+              <a:t>11/19/2024</a:t>
             </a:fld>
             <a:endParaRPr lang="en-US"/>
           </a:p>
@@ -1138,7 +1138,7 @@
           <a:p>
             <a:fld id="{F8790B07-F0DA-42FB-9B41-9B73EF6DB6A9}" type="datetimeFigureOut">
               <a:rPr lang="en-US" smtClean="0"/>
-              <a:t>11/18/2024</a:t>
+              <a:t>11/19/2024</a:t>
             </a:fld>
             <a:endParaRPr lang="en-US"/>
           </a:p>
@@ -1403,7 +1403,7 @@
           <a:p>
             <a:fld id="{F8790B07-F0DA-42FB-9B41-9B73EF6DB6A9}" type="datetimeFigureOut">
               <a:rPr lang="en-US" smtClean="0"/>
-              <a:t>11/18/2024</a:t>
+              <a:t>11/19/2024</a:t>
             </a:fld>
             <a:endParaRPr lang="en-US"/>
           </a:p>
@@ -1815,7 +1815,7 @@
           <a:p>
             <a:fld id="{F8790B07-F0DA-42FB-9B41-9B73EF6DB6A9}" type="datetimeFigureOut">
               <a:rPr lang="en-US" smtClean="0"/>
-              <a:t>11/18/2024</a:t>
+              <a:t>11/19/2024</a:t>
             </a:fld>
             <a:endParaRPr lang="en-US"/>
           </a:p>
@@ -1956,7 +1956,7 @@
           <a:p>
             <a:fld id="{F8790B07-F0DA-42FB-9B41-9B73EF6DB6A9}" type="datetimeFigureOut">
               <a:rPr lang="en-US" smtClean="0"/>
-              <a:t>11/18/2024</a:t>
+              <a:t>11/19/2024</a:t>
             </a:fld>
             <a:endParaRPr lang="en-US"/>
           </a:p>
@@ -2069,7 +2069,7 @@
           <a:p>
             <a:fld id="{F8790B07-F0DA-42FB-9B41-9B73EF6DB6A9}" type="datetimeFigureOut">
               <a:rPr lang="en-US" smtClean="0"/>
-              <a:t>11/18/2024</a:t>
+              <a:t>11/19/2024</a:t>
             </a:fld>
             <a:endParaRPr lang="en-US"/>
           </a:p>
@@ -2380,7 +2380,7 @@
           <a:p>
             <a:fld id="{F8790B07-F0DA-42FB-9B41-9B73EF6DB6A9}" type="datetimeFigureOut">
               <a:rPr lang="en-US" smtClean="0"/>
-              <a:t>11/18/2024</a:t>
+              <a:t>11/19/2024</a:t>
             </a:fld>
             <a:endParaRPr lang="en-US"/>
           </a:p>
@@ -2668,7 +2668,7 @@
           <a:p>
             <a:fld id="{F8790B07-F0DA-42FB-9B41-9B73EF6DB6A9}" type="datetimeFigureOut">
               <a:rPr lang="en-US" smtClean="0"/>
-              <a:t>11/18/2024</a:t>
+              <a:t>11/19/2024</a:t>
             </a:fld>
             <a:endParaRPr lang="en-US"/>
           </a:p>
@@ -2909,7 +2909,7 @@
           <a:p>
             <a:fld id="{F8790B07-F0DA-42FB-9B41-9B73EF6DB6A9}" type="datetimeFigureOut">
               <a:rPr lang="en-US" smtClean="0"/>
-              <a:t>11/18/2024</a:t>
+              <a:t>11/19/2024</a:t>
             </a:fld>
             <a:endParaRPr lang="en-US"/>
           </a:p>
@@ -3416,7 +3416,7 @@
         <p:spPr>
           <a:xfrm>
             <a:off x="1007133" y="-18287"/>
-            <a:ext cx="4862020" cy="6876285"/>
+            <a:ext cx="4862019" cy="6876285"/>
           </a:xfrm>
           <a:prstGeom prst="rect">
             <a:avLst/>

</xml_diff>

<commit_message>
Revise "The Great Escape" document to enhance narrative and character roles
</commit_message>
<xml_diff>
--- a/public/data/_work-in-progress/_share/square-previews.pptx
+++ b/public/data/_work-in-progress/_share/square-previews.pptx
@@ -259,7 +259,7 @@
           <a:p>
             <a:fld id="{F8790B07-F0DA-42FB-9B41-9B73EF6DB6A9}" type="datetimeFigureOut">
               <a:rPr lang="en-US" smtClean="0"/>
-              <a:t>1/2/2025</a:t>
+              <a:t>1/10/2025</a:t>
             </a:fld>
             <a:endParaRPr lang="en-US"/>
           </a:p>
@@ -457,7 +457,7 @@
           <a:p>
             <a:fld id="{F8790B07-F0DA-42FB-9B41-9B73EF6DB6A9}" type="datetimeFigureOut">
               <a:rPr lang="en-US" smtClean="0"/>
-              <a:t>1/2/2025</a:t>
+              <a:t>1/10/2025</a:t>
             </a:fld>
             <a:endParaRPr lang="en-US"/>
           </a:p>
@@ -665,7 +665,7 @@
           <a:p>
             <a:fld id="{F8790B07-F0DA-42FB-9B41-9B73EF6DB6A9}" type="datetimeFigureOut">
               <a:rPr lang="en-US" smtClean="0"/>
-              <a:t>1/2/2025</a:t>
+              <a:t>1/10/2025</a:t>
             </a:fld>
             <a:endParaRPr lang="en-US"/>
           </a:p>
@@ -863,7 +863,7 @@
           <a:p>
             <a:fld id="{F8790B07-F0DA-42FB-9B41-9B73EF6DB6A9}" type="datetimeFigureOut">
               <a:rPr lang="en-US" smtClean="0"/>
-              <a:t>1/2/2025</a:t>
+              <a:t>1/10/2025</a:t>
             </a:fld>
             <a:endParaRPr lang="en-US"/>
           </a:p>
@@ -1138,7 +1138,7 @@
           <a:p>
             <a:fld id="{F8790B07-F0DA-42FB-9B41-9B73EF6DB6A9}" type="datetimeFigureOut">
               <a:rPr lang="en-US" smtClean="0"/>
-              <a:t>1/2/2025</a:t>
+              <a:t>1/10/2025</a:t>
             </a:fld>
             <a:endParaRPr lang="en-US"/>
           </a:p>
@@ -1403,7 +1403,7 @@
           <a:p>
             <a:fld id="{F8790B07-F0DA-42FB-9B41-9B73EF6DB6A9}" type="datetimeFigureOut">
               <a:rPr lang="en-US" smtClean="0"/>
-              <a:t>1/2/2025</a:t>
+              <a:t>1/10/2025</a:t>
             </a:fld>
             <a:endParaRPr lang="en-US"/>
           </a:p>
@@ -1815,7 +1815,7 @@
           <a:p>
             <a:fld id="{F8790B07-F0DA-42FB-9B41-9B73EF6DB6A9}" type="datetimeFigureOut">
               <a:rPr lang="en-US" smtClean="0"/>
-              <a:t>1/2/2025</a:t>
+              <a:t>1/10/2025</a:t>
             </a:fld>
             <a:endParaRPr lang="en-US"/>
           </a:p>
@@ -1956,7 +1956,7 @@
           <a:p>
             <a:fld id="{F8790B07-F0DA-42FB-9B41-9B73EF6DB6A9}" type="datetimeFigureOut">
               <a:rPr lang="en-US" smtClean="0"/>
-              <a:t>1/2/2025</a:t>
+              <a:t>1/10/2025</a:t>
             </a:fld>
             <a:endParaRPr lang="en-US"/>
           </a:p>
@@ -2069,7 +2069,7 @@
           <a:p>
             <a:fld id="{F8790B07-F0DA-42FB-9B41-9B73EF6DB6A9}" type="datetimeFigureOut">
               <a:rPr lang="en-US" smtClean="0"/>
-              <a:t>1/2/2025</a:t>
+              <a:t>1/10/2025</a:t>
             </a:fld>
             <a:endParaRPr lang="en-US"/>
           </a:p>
@@ -2380,7 +2380,7 @@
           <a:p>
             <a:fld id="{F8790B07-F0DA-42FB-9B41-9B73EF6DB6A9}" type="datetimeFigureOut">
               <a:rPr lang="en-US" smtClean="0"/>
-              <a:t>1/2/2025</a:t>
+              <a:t>1/10/2025</a:t>
             </a:fld>
             <a:endParaRPr lang="en-US"/>
           </a:p>
@@ -2668,7 +2668,7 @@
           <a:p>
             <a:fld id="{F8790B07-F0DA-42FB-9B41-9B73EF6DB6A9}" type="datetimeFigureOut">
               <a:rPr lang="en-US" smtClean="0"/>
-              <a:t>1/2/2025</a:t>
+              <a:t>1/10/2025</a:t>
             </a:fld>
             <a:endParaRPr lang="en-US"/>
           </a:p>
@@ -2909,7 +2909,7 @@
           <a:p>
             <a:fld id="{F8790B07-F0DA-42FB-9B41-9B73EF6DB6A9}" type="datetimeFigureOut">
               <a:rPr lang="en-US" smtClean="0"/>
-              <a:t>1/2/2025</a:t>
+              <a:t>1/10/2025</a:t>
             </a:fld>
             <a:endParaRPr lang="en-US"/>
           </a:p>
@@ -3415,8 +3415,8 @@
         </p:blipFill>
         <p:spPr>
           <a:xfrm>
-            <a:off x="1007133" y="-17950"/>
-            <a:ext cx="4862019" cy="6875611"/>
+            <a:off x="1007371" y="-17950"/>
+            <a:ext cx="4861543" cy="6875610"/>
           </a:xfrm>
           <a:prstGeom prst="rect">
             <a:avLst/>

</xml_diff>